<commit_message>
Refactor PDF text extraction in documentTextExtractor.ts. Updated the PDF parsing logic to use a new parser implementation, improving reliability and error handling during text extraction.
</commit_message>
<xml_diff>
--- a/data/docs/Project_Timeline_1077884 1.pptx
+++ b/data/docs/Project_Timeline_1077884 1.pptx
@@ -275,7 +275,7 @@
           <c:showPercent val="0"/>
           <c:showBubbleSize val="0"/>
         </c:dLbls>
-        <c:gapWidth val="150"/>
+        <c:gapWidth val="0"/>
         <c:overlap val="100"/>
         <c:axId val="-2068027336"/>
         <c:axId val="-2113994440"/>
@@ -343,10 +343,15 @@
         <c:crossAx val="-2068027336"/>
         <c:crosses val="autoZero"/>
         <c:crossBetween val="between"/>
+        <c:majorUnit val="1"/>
       </c:valAx>
     </c:plotArea>
     <c:legend>
       <c:legendPos val="r"/>
+      <c:legendEntry>
+        <c:idx val="0"/>
+        <c:delete val="1"/>
+      </c:legendEntry>
       <c:overlay val="0"/>
     </c:legend>
     <c:plotVisOnly val="1"/>
@@ -548,7 +553,7 @@
           <a:p>
             <a:fld id="{5BCAD085-E8A6-8845-BD4E-CB4CCA059FC4}" type="datetimeFigureOut">
               <a:rPr lang="en-US" smtClean="0"/>
-              <a:t>2/10/2026</a:t>
+              <a:t>2/12/2026</a:t>
             </a:fld>
             <a:endParaRPr lang="en-US"/>
           </a:p>
@@ -716,7 +721,7 @@
           <a:p>
             <a:fld id="{5BCAD085-E8A6-8845-BD4E-CB4CCA059FC4}" type="datetimeFigureOut">
               <a:rPr lang="en-US" smtClean="0"/>
-              <a:t>2/10/2026</a:t>
+              <a:t>2/12/2026</a:t>
             </a:fld>
             <a:endParaRPr lang="en-US"/>
           </a:p>
@@ -894,7 +899,7 @@
           <a:p>
             <a:fld id="{5BCAD085-E8A6-8845-BD4E-CB4CCA059FC4}" type="datetimeFigureOut">
               <a:rPr lang="en-US" smtClean="0"/>
-              <a:t>2/10/2026</a:t>
+              <a:t>2/12/2026</a:t>
             </a:fld>
             <a:endParaRPr lang="en-US"/>
           </a:p>
@@ -1062,7 +1067,7 @@
           <a:p>
             <a:fld id="{5BCAD085-E8A6-8845-BD4E-CB4CCA059FC4}" type="datetimeFigureOut">
               <a:rPr lang="en-US" smtClean="0"/>
-              <a:t>2/10/2026</a:t>
+              <a:t>2/12/2026</a:t>
             </a:fld>
             <a:endParaRPr lang="en-US"/>
           </a:p>
@@ -1307,7 +1312,7 @@
           <a:p>
             <a:fld id="{5BCAD085-E8A6-8845-BD4E-CB4CCA059FC4}" type="datetimeFigureOut">
               <a:rPr lang="en-US" smtClean="0"/>
-              <a:t>2/10/2026</a:t>
+              <a:t>2/12/2026</a:t>
             </a:fld>
             <a:endParaRPr lang="en-US"/>
           </a:p>
@@ -1592,7 +1597,7 @@
           <a:p>
             <a:fld id="{5BCAD085-E8A6-8845-BD4E-CB4CCA059FC4}" type="datetimeFigureOut">
               <a:rPr lang="en-US" smtClean="0"/>
-              <a:t>2/10/2026</a:t>
+              <a:t>2/12/2026</a:t>
             </a:fld>
             <a:endParaRPr lang="en-US"/>
           </a:p>
@@ -2011,7 +2016,7 @@
           <a:p>
             <a:fld id="{5BCAD085-E8A6-8845-BD4E-CB4CCA059FC4}" type="datetimeFigureOut">
               <a:rPr lang="en-US" smtClean="0"/>
-              <a:t>2/10/2026</a:t>
+              <a:t>2/12/2026</a:t>
             </a:fld>
             <a:endParaRPr lang="en-US"/>
           </a:p>
@@ -2128,7 +2133,7 @@
           <a:p>
             <a:fld id="{5BCAD085-E8A6-8845-BD4E-CB4CCA059FC4}" type="datetimeFigureOut">
               <a:rPr lang="en-US" smtClean="0"/>
-              <a:t>2/10/2026</a:t>
+              <a:t>2/12/2026</a:t>
             </a:fld>
             <a:endParaRPr lang="en-US"/>
           </a:p>
@@ -2223,7 +2228,7 @@
           <a:p>
             <a:fld id="{5BCAD085-E8A6-8845-BD4E-CB4CCA059FC4}" type="datetimeFigureOut">
               <a:rPr lang="en-US" smtClean="0"/>
-              <a:t>2/10/2026</a:t>
+              <a:t>2/12/2026</a:t>
             </a:fld>
             <a:endParaRPr lang="en-US"/>
           </a:p>
@@ -2498,7 +2503,7 @@
           <a:p>
             <a:fld id="{5BCAD085-E8A6-8845-BD4E-CB4CCA059FC4}" type="datetimeFigureOut">
               <a:rPr lang="en-US" smtClean="0"/>
-              <a:t>2/10/2026</a:t>
+              <a:t>2/12/2026</a:t>
             </a:fld>
             <a:endParaRPr lang="en-US"/>
           </a:p>
@@ -2750,7 +2755,7 @@
           <a:p>
             <a:fld id="{5BCAD085-E8A6-8845-BD4E-CB4CCA059FC4}" type="datetimeFigureOut">
               <a:rPr lang="en-US" smtClean="0"/>
-              <a:t>2/10/2026</a:t>
+              <a:t>2/12/2026</a:t>
             </a:fld>
             <a:endParaRPr lang="en-US"/>
           </a:p>
@@ -2961,7 +2966,7 @@
           <a:p>
             <a:fld id="{5BCAD085-E8A6-8845-BD4E-CB4CCA059FC4}" type="datetimeFigureOut">
               <a:rPr lang="en-US" smtClean="0"/>
-              <a:t>2/10/2026</a:t>
+              <a:t>2/12/2026</a:t>
             </a:fld>
             <a:endParaRPr lang="en-US"/>
           </a:p>

</xml_diff>